<commit_message>
Tests redesigned, small changes in "Project_Charter_-_QuestMapper.pptx", renamed "Requirement_-_QuestMapper_2025_02_07.pdf to Requirement_-_QuestMapper.pdf"
</commit_message>
<xml_diff>
--- a/Project_Charter_-_QuestMapper.pptx
+++ b/Project_Charter_-_QuestMapper.pptx
@@ -219,7 +219,7 @@
           <a:p>
             <a:fld id="{8888E5F7-65C2-40E0-8A25-9A4A465BD09E}" type="datetimeFigureOut">
               <a:rPr lang="de-DE" smtClean="0"/>
-              <a:t>07.02.2025</a:t>
+              <a:t>08.02.2025</a:t>
             </a:fld>
             <a:endParaRPr lang="de-DE"/>
           </a:p>
@@ -632,7 +632,7 @@
           <a:p>
             <a:fld id="{31F8C0B8-A119-4A07-B89F-6E701B20A39A}" type="datetime1">
               <a:rPr lang="de-DE" smtClean="0"/>
-              <a:t>07.02.2025</a:t>
+              <a:t>08.02.2025</a:t>
             </a:fld>
             <a:endParaRPr lang="de-DE"/>
           </a:p>
@@ -853,7 +853,7 @@
           <a:p>
             <a:fld id="{6B7B9F8C-55C7-4647-ADDC-2CE3AABD4883}" type="datetime1">
               <a:rPr lang="de-DE" smtClean="0"/>
-              <a:t>07.02.2025</a:t>
+              <a:t>08.02.2025</a:t>
             </a:fld>
             <a:endParaRPr lang="de-DE"/>
           </a:p>
@@ -1287,7 +1287,7 @@
           <a:p>
             <a:fld id="{8113C1DD-03A7-48A0-B43B-9FCA538C82BC}" type="datetime1">
               <a:rPr lang="de-DE" smtClean="0"/>
-              <a:t>07.02.2025</a:t>
+              <a:t>08.02.2025</a:t>
             </a:fld>
             <a:endParaRPr lang="de-DE"/>
           </a:p>
@@ -1308,7 +1308,7 @@
           <p:nvPr>
             <p:extLst>
               <p:ext uri="{D42A27DB-BD31-4B8C-83A1-F6EECF244321}">
-                <p14:modId xmlns:p14="http://schemas.microsoft.com/office/powerpoint/2010/main" val="1072557967"/>
+                <p14:modId xmlns:p14="http://schemas.microsoft.com/office/powerpoint/2010/main" val="3179835714"/>
               </p:ext>
             </p:extLst>
           </p:nvPr>
@@ -2201,7 +2201,7 @@
                           <a:latin typeface="Arial" panose="020B0604020202020204" pitchFamily="34" charset="0"/>
                           <a:cs typeface="Arial" panose="020B0604020202020204" pitchFamily="34" charset="0"/>
                         </a:rPr>
-                        <a:t>Fertigstellung: Sommer 2023</a:t>
+                        <a:t>Fertigstellung: ?</a:t>
                       </a:r>
                     </a:p>
                   </a:txBody>
@@ -2437,7 +2437,7 @@
           <a:p>
             <a:fld id="{31F8C0B8-A119-4A07-B89F-6E701B20A39A}" type="datetime1">
               <a:rPr lang="de-DE" smtClean="0"/>
-              <a:t>07.02.2025</a:t>
+              <a:t>08.02.2025</a:t>
             </a:fld>
             <a:endParaRPr lang="de-DE"/>
           </a:p>
@@ -4364,7 +4364,7 @@
           <a:p>
             <a:fld id="{31F8C0B8-A119-4A07-B89F-6E701B20A39A}" type="datetime1">
               <a:rPr lang="de-DE" smtClean="0"/>
-              <a:t>07.02.2025</a:t>
+              <a:t>08.02.2025</a:t>
             </a:fld>
             <a:endParaRPr lang="de-DE"/>
           </a:p>
@@ -4709,7 +4709,7 @@
           <a:p>
             <a:fld id="{31F8C0B8-A119-4A07-B89F-6E701B20A39A}" type="datetime1">
               <a:rPr lang="de-DE" smtClean="0"/>
-              <a:t>07.02.2025</a:t>
+              <a:t>08.02.2025</a:t>
             </a:fld>
             <a:endParaRPr lang="de-DE"/>
           </a:p>
@@ -5652,7 +5652,7 @@
           <a:p>
             <a:fld id="{31F8C0B8-A119-4A07-B89F-6E701B20A39A}" type="datetime1">
               <a:rPr lang="de-DE" smtClean="0"/>
-              <a:t>07.02.2025</a:t>
+              <a:t>08.02.2025</a:t>
             </a:fld>
             <a:endParaRPr lang="de-DE"/>
           </a:p>
@@ -7999,7 +7999,7 @@
           <a:p>
             <a:fld id="{31F8C0B8-A119-4A07-B89F-6E701B20A39A}" type="datetime1">
               <a:rPr lang="de-DE" smtClean="0"/>
-              <a:t>07.02.2025</a:t>
+              <a:t>08.02.2025</a:t>
             </a:fld>
             <a:endParaRPr lang="de-DE"/>
           </a:p>
@@ -8548,7 +8548,7 @@
           <a:p>
             <a:fld id="{31F8C0B8-A119-4A07-B89F-6E701B20A39A}" type="datetime1">
               <a:rPr lang="de-DE" smtClean="0"/>
-              <a:t>07.02.2025</a:t>
+              <a:t>08.02.2025</a:t>
             </a:fld>
             <a:endParaRPr lang="de-DE"/>
           </a:p>
@@ -8803,7 +8803,7 @@
           <a:p>
             <a:fld id="{31F8C0B8-A119-4A07-B89F-6E701B20A39A}" type="datetime1">
               <a:rPr lang="de-DE" smtClean="0"/>
-              <a:t>07.02.2025</a:t>
+              <a:t>08.02.2025</a:t>
             </a:fld>
             <a:endParaRPr lang="de-DE"/>
           </a:p>
@@ -8941,7 +8941,7 @@
                 <a:latin typeface="Arial" panose="020B0604020202020204" pitchFamily="34" charset="0"/>
                 <a:cs typeface="Arial" panose="020B0604020202020204" pitchFamily="34" charset="0"/>
               </a:rPr>
-              <a:t>07.02.2025</a:t>
+              <a:t>08.02.2025</a:t>
             </a:fld>
             <a:endParaRPr lang="de-DE">
               <a:latin typeface="Arial" panose="020B0604020202020204" pitchFamily="34" charset="0"/>
@@ -9955,7 +9955,7 @@
                 <a:latin typeface="Arial" panose="020B0604020202020204" pitchFamily="34" charset="0"/>
                 <a:cs typeface="Arial" panose="020B0604020202020204" pitchFamily="34" charset="0"/>
               </a:rPr>
-              <a:t>07.02.2025</a:t>
+              <a:t>08.02.2025</a:t>
             </a:fld>
             <a:endParaRPr lang="de-DE">
               <a:latin typeface="Arial" panose="020B0604020202020204" pitchFamily="34" charset="0"/>
@@ -11388,7 +11388,7 @@
                 <a:latin typeface="Arial" panose="020B0604020202020204" pitchFamily="34" charset="0"/>
                 <a:cs typeface="Arial" panose="020B0604020202020204" pitchFamily="34" charset="0"/>
               </a:rPr>
-              <a:t>07.02.2025</a:t>
+              <a:t>08.02.2025</a:t>
             </a:fld>
             <a:endParaRPr lang="de-DE">
               <a:latin typeface="Arial" panose="020B0604020202020204" pitchFamily="34" charset="0"/>
@@ -12446,7 +12446,10 @@
             <a:avLst/>
           </a:prstGeom>
           <a:solidFill>
-            <a:schemeClr val="bg1"/>
+            <a:schemeClr val="accent3">
+              <a:lumMod val="20000"/>
+              <a:lumOff val="80000"/>
+            </a:schemeClr>
           </a:solidFill>
         </p:spPr>
         <p:txBody>
@@ -12915,7 +12918,7 @@
           <a:p>
             <a:fld id="{31F8C0B8-A119-4A07-B89F-6E701B20A39A}" type="datetime1">
               <a:rPr lang="de-DE" smtClean="0"/>
-              <a:t>07.02.2025</a:t>
+              <a:t>08.02.2025</a:t>
             </a:fld>
             <a:endParaRPr lang="de-DE"/>
           </a:p>
@@ -13069,7 +13072,7 @@
                 <a:latin typeface="Arial" panose="020B0604020202020204" pitchFamily="34" charset="0"/>
                 <a:cs typeface="Arial" panose="020B0604020202020204" pitchFamily="34" charset="0"/>
               </a:rPr>
-              <a:t>07.02.2025</a:t>
+              <a:t>08.02.2025</a:t>
             </a:fld>
             <a:endParaRPr lang="de-DE">
               <a:latin typeface="Arial" panose="020B0604020202020204" pitchFamily="34" charset="0"/>
@@ -13451,7 +13454,7 @@
                 <a:latin typeface="Arial" panose="020B0604020202020204" pitchFamily="34" charset="0"/>
                 <a:cs typeface="Arial" panose="020B0604020202020204" pitchFamily="34" charset="0"/>
               </a:rPr>
-              <a:t>07.02.2025</a:t>
+              <a:t>08.02.2025</a:t>
             </a:fld>
             <a:endParaRPr lang="de-DE">
               <a:latin typeface="Arial" panose="020B0604020202020204" pitchFamily="34" charset="0"/>
@@ -13714,7 +13717,7 @@
                 <a:latin typeface="Arial" panose="020B0604020202020204" pitchFamily="34" charset="0"/>
                 <a:cs typeface="Arial" panose="020B0604020202020204" pitchFamily="34" charset="0"/>
               </a:rPr>
-              <a:t>07.02.2025</a:t>
+              <a:t>08.02.2025</a:t>
             </a:fld>
             <a:endParaRPr lang="de-DE">
               <a:latin typeface="Arial" panose="020B0604020202020204" pitchFamily="34" charset="0"/>
@@ -14148,7 +14151,7 @@
                 <a:latin typeface="Arial" panose="020B0604020202020204" pitchFamily="34" charset="0"/>
                 <a:cs typeface="Arial" panose="020B0604020202020204" pitchFamily="34" charset="0"/>
               </a:rPr>
-              <a:t>07.02.2025</a:t>
+              <a:t>08.02.2025</a:t>
             </a:fld>
             <a:endParaRPr lang="de-DE">
               <a:latin typeface="Arial" panose="020B0604020202020204" pitchFamily="34" charset="0"/>
@@ -14172,7 +14175,7 @@
           <p:nvPr>
             <p:extLst>
               <p:ext uri="{D42A27DB-BD31-4B8C-83A1-F6EECF244321}">
-                <p14:modId xmlns:p14="http://schemas.microsoft.com/office/powerpoint/2010/main" val="1979683707"/>
+                <p14:modId xmlns:p14="http://schemas.microsoft.com/office/powerpoint/2010/main" val="211838285"/>
               </p:ext>
             </p:extLst>
           </p:nvPr>
@@ -14308,7 +14311,10 @@
                     <a:bodyPr/>
                     <a:lstStyle/>
                     <a:p>
-                      <a:endParaRPr lang="de-DE"/>
+                      <a:r>
+                        <a:rPr lang="de-DE" dirty="0"/>
+                        <a:t>2025.02.08</a:t>
+                      </a:r>
                     </a:p>
                   </a:txBody>
                   <a:tcPr/>
@@ -14318,6 +14324,14 @@
                     <a:bodyPr/>
                     <a:lstStyle/>
                     <a:p>
+                      <a:r>
+                        <a:rPr lang="de-DE" dirty="0"/>
+                        <a:t>Datum der Fertigstellung aktualisiert, Sichtbarkeit von verwendet Folie 19 (SW-Komp. </a:t>
+                      </a:r>
+                      <a:r>
+                        <a:rPr lang="de-DE"/>
+                        <a:t>III)</a:t>
+                      </a:r>
                       <a:endParaRPr lang="de-DE" dirty="0"/>
                     </a:p>
                   </a:txBody>
@@ -14945,7 +14959,7 @@
           <a:p>
             <a:fld id="{31F8C0B8-A119-4A07-B89F-6E701B20A39A}" type="datetime1">
               <a:rPr lang="de-DE" smtClean="0"/>
-              <a:t>07.02.2025</a:t>
+              <a:t>08.02.2025</a:t>
             </a:fld>
             <a:endParaRPr lang="de-DE"/>
           </a:p>
@@ -15371,7 +15385,7 @@
           <a:p>
             <a:fld id="{31F8C0B8-A119-4A07-B89F-6E701B20A39A}" type="datetime1">
               <a:rPr lang="de-DE" smtClean="0"/>
-              <a:t>07.02.2025</a:t>
+              <a:t>08.02.2025</a:t>
             </a:fld>
             <a:endParaRPr lang="de-DE"/>
           </a:p>
@@ -15603,7 +15617,7 @@
           <a:p>
             <a:fld id="{31F8C0B8-A119-4A07-B89F-6E701B20A39A}" type="datetime1">
               <a:rPr lang="de-DE" smtClean="0"/>
-              <a:t>07.02.2025</a:t>
+              <a:t>08.02.2025</a:t>
             </a:fld>
             <a:endParaRPr lang="de-DE"/>
           </a:p>
@@ -15778,7 +15792,7 @@
           <a:p>
             <a:fld id="{31F8C0B8-A119-4A07-B89F-6E701B20A39A}" type="datetime1">
               <a:rPr lang="de-DE" smtClean="0"/>
-              <a:t>07.02.2025</a:t>
+              <a:t>08.02.2025</a:t>
             </a:fld>
             <a:endParaRPr lang="de-DE"/>
           </a:p>
@@ -16088,7 +16102,7 @@
           <a:p>
             <a:fld id="{31F8C0B8-A119-4A07-B89F-6E701B20A39A}" type="datetime1">
               <a:rPr lang="de-DE" smtClean="0"/>
-              <a:t>07.02.2025</a:t>
+              <a:t>08.02.2025</a:t>
             </a:fld>
             <a:endParaRPr lang="de-DE"/>
           </a:p>
@@ -16425,7 +16439,7 @@
           <a:p>
             <a:fld id="{31F8C0B8-A119-4A07-B89F-6E701B20A39A}" type="datetime1">
               <a:rPr lang="de-DE" smtClean="0"/>
-              <a:t>07.02.2025</a:t>
+              <a:t>08.02.2025</a:t>
             </a:fld>
             <a:endParaRPr lang="de-DE"/>
           </a:p>
@@ -16575,7 +16589,7 @@
           <a:p>
             <a:fld id="{31F8C0B8-A119-4A07-B89F-6E701B20A39A}" type="datetime1">
               <a:rPr lang="de-DE" smtClean="0"/>
-              <a:t>07.02.2025</a:t>
+              <a:t>08.02.2025</a:t>
             </a:fld>
             <a:endParaRPr lang="de-DE"/>
           </a:p>

</xml_diff>

<commit_message>
Kleinere Anpassungen in der PowerPoint -> Vorbereitung zur Übernahme in GitHub Wiki
</commit_message>
<xml_diff>
--- a/Project_Charter_-_QuestMapper.pptx
+++ b/Project_Charter_-_QuestMapper.pptx
@@ -219,7 +219,7 @@
           <a:p>
             <a:fld id="{8888E5F7-65C2-40E0-8A25-9A4A465BD09E}" type="datetimeFigureOut">
               <a:rPr lang="de-DE" smtClean="0"/>
-              <a:t>08.02.2025</a:t>
+              <a:t>16.02.2025</a:t>
             </a:fld>
             <a:endParaRPr lang="de-DE"/>
           </a:p>
@@ -632,7 +632,7 @@
           <a:p>
             <a:fld id="{31F8C0B8-A119-4A07-B89F-6E701B20A39A}" type="datetime1">
               <a:rPr lang="de-DE" smtClean="0"/>
-              <a:t>08.02.2025</a:t>
+              <a:t>16.02.2025</a:t>
             </a:fld>
             <a:endParaRPr lang="de-DE"/>
           </a:p>
@@ -853,7 +853,7 @@
           <a:p>
             <a:fld id="{6B7B9F8C-55C7-4647-ADDC-2CE3AABD4883}" type="datetime1">
               <a:rPr lang="de-DE" smtClean="0"/>
-              <a:t>08.02.2025</a:t>
+              <a:t>16.02.2025</a:t>
             </a:fld>
             <a:endParaRPr lang="de-DE"/>
           </a:p>
@@ -1287,7 +1287,7 @@
           <a:p>
             <a:fld id="{8113C1DD-03A7-48A0-B43B-9FCA538C82BC}" type="datetime1">
               <a:rPr lang="de-DE" smtClean="0"/>
-              <a:t>08.02.2025</a:t>
+              <a:t>16.02.2025</a:t>
             </a:fld>
             <a:endParaRPr lang="de-DE"/>
           </a:p>
@@ -2437,7 +2437,7 @@
           <a:p>
             <a:fld id="{31F8C0B8-A119-4A07-B89F-6E701B20A39A}" type="datetime1">
               <a:rPr lang="de-DE" smtClean="0"/>
-              <a:t>08.02.2025</a:t>
+              <a:t>16.02.2025</a:t>
             </a:fld>
             <a:endParaRPr lang="de-DE"/>
           </a:p>
@@ -4364,7 +4364,7 @@
           <a:p>
             <a:fld id="{31F8C0B8-A119-4A07-B89F-6E701B20A39A}" type="datetime1">
               <a:rPr lang="de-DE" smtClean="0"/>
-              <a:t>08.02.2025</a:t>
+              <a:t>16.02.2025</a:t>
             </a:fld>
             <a:endParaRPr lang="de-DE"/>
           </a:p>
@@ -4601,7 +4601,7 @@
         </p:blipFill>
         <p:spPr bwMode="auto">
           <a:xfrm>
-            <a:off x="3657600" y="4926250"/>
+            <a:off x="3707759" y="4926250"/>
             <a:ext cx="4890782" cy="1723932"/>
           </a:xfrm>
           <a:prstGeom prst="rect">
@@ -4709,7 +4709,7 @@
           <a:p>
             <a:fld id="{31F8C0B8-A119-4A07-B89F-6E701B20A39A}" type="datetime1">
               <a:rPr lang="de-DE" smtClean="0"/>
-              <a:t>08.02.2025</a:t>
+              <a:t>16.02.2025</a:t>
             </a:fld>
             <a:endParaRPr lang="de-DE"/>
           </a:p>
@@ -5652,7 +5652,7 @@
           <a:p>
             <a:fld id="{31F8C0B8-A119-4A07-B89F-6E701B20A39A}" type="datetime1">
               <a:rPr lang="de-DE" smtClean="0"/>
-              <a:t>08.02.2025</a:t>
+              <a:t>16.02.2025</a:t>
             </a:fld>
             <a:endParaRPr lang="de-DE"/>
           </a:p>
@@ -7999,7 +7999,7 @@
           <a:p>
             <a:fld id="{31F8C0B8-A119-4A07-B89F-6E701B20A39A}" type="datetime1">
               <a:rPr lang="de-DE" smtClean="0"/>
-              <a:t>08.02.2025</a:t>
+              <a:t>16.02.2025</a:t>
             </a:fld>
             <a:endParaRPr lang="de-DE"/>
           </a:p>
@@ -8548,7 +8548,7 @@
           <a:p>
             <a:fld id="{31F8C0B8-A119-4A07-B89F-6E701B20A39A}" type="datetime1">
               <a:rPr lang="de-DE" smtClean="0"/>
-              <a:t>08.02.2025</a:t>
+              <a:t>16.02.2025</a:t>
             </a:fld>
             <a:endParaRPr lang="de-DE"/>
           </a:p>
@@ -8803,7 +8803,7 @@
           <a:p>
             <a:fld id="{31F8C0B8-A119-4A07-B89F-6E701B20A39A}" type="datetime1">
               <a:rPr lang="de-DE" smtClean="0"/>
-              <a:t>08.02.2025</a:t>
+              <a:t>16.02.2025</a:t>
             </a:fld>
             <a:endParaRPr lang="de-DE"/>
           </a:p>
@@ -8941,7 +8941,7 @@
                 <a:latin typeface="Arial" panose="020B0604020202020204" pitchFamily="34" charset="0"/>
                 <a:cs typeface="Arial" panose="020B0604020202020204" pitchFamily="34" charset="0"/>
               </a:rPr>
-              <a:t>08.02.2025</a:t>
+              <a:t>16.02.2025</a:t>
             </a:fld>
             <a:endParaRPr lang="de-DE">
               <a:latin typeface="Arial" panose="020B0604020202020204" pitchFamily="34" charset="0"/>
@@ -9955,7 +9955,7 @@
                 <a:latin typeface="Arial" panose="020B0604020202020204" pitchFamily="34" charset="0"/>
                 <a:cs typeface="Arial" panose="020B0604020202020204" pitchFamily="34" charset="0"/>
               </a:rPr>
-              <a:t>08.02.2025</a:t>
+              <a:t>16.02.2025</a:t>
             </a:fld>
             <a:endParaRPr lang="de-DE">
               <a:latin typeface="Arial" panose="020B0604020202020204" pitchFamily="34" charset="0"/>
@@ -11388,7 +11388,7 @@
                 <a:latin typeface="Arial" panose="020B0604020202020204" pitchFamily="34" charset="0"/>
                 <a:cs typeface="Arial" panose="020B0604020202020204" pitchFamily="34" charset="0"/>
               </a:rPr>
-              <a:t>08.02.2025</a:t>
+              <a:t>16.02.2025</a:t>
             </a:fld>
             <a:endParaRPr lang="de-DE">
               <a:latin typeface="Arial" panose="020B0604020202020204" pitchFamily="34" charset="0"/>
@@ -12918,7 +12918,7 @@
           <a:p>
             <a:fld id="{31F8C0B8-A119-4A07-B89F-6E701B20A39A}" type="datetime1">
               <a:rPr lang="de-DE" smtClean="0"/>
-              <a:t>08.02.2025</a:t>
+              <a:t>16.02.2025</a:t>
             </a:fld>
             <a:endParaRPr lang="de-DE"/>
           </a:p>
@@ -13072,7 +13072,7 @@
                 <a:latin typeface="Arial" panose="020B0604020202020204" pitchFamily="34" charset="0"/>
                 <a:cs typeface="Arial" panose="020B0604020202020204" pitchFamily="34" charset="0"/>
               </a:rPr>
-              <a:t>08.02.2025</a:t>
+              <a:t>16.02.2025</a:t>
             </a:fld>
             <a:endParaRPr lang="de-DE">
               <a:latin typeface="Arial" panose="020B0604020202020204" pitchFamily="34" charset="0"/>
@@ -13454,7 +13454,7 @@
                 <a:latin typeface="Arial" panose="020B0604020202020204" pitchFamily="34" charset="0"/>
                 <a:cs typeface="Arial" panose="020B0604020202020204" pitchFamily="34" charset="0"/>
               </a:rPr>
-              <a:t>08.02.2025</a:t>
+              <a:t>16.02.2025</a:t>
             </a:fld>
             <a:endParaRPr lang="de-DE">
               <a:latin typeface="Arial" panose="020B0604020202020204" pitchFamily="34" charset="0"/>
@@ -13717,7 +13717,7 @@
                 <a:latin typeface="Arial" panose="020B0604020202020204" pitchFamily="34" charset="0"/>
                 <a:cs typeface="Arial" panose="020B0604020202020204" pitchFamily="34" charset="0"/>
               </a:rPr>
-              <a:t>08.02.2025</a:t>
+              <a:t>16.02.2025</a:t>
             </a:fld>
             <a:endParaRPr lang="de-DE">
               <a:latin typeface="Arial" panose="020B0604020202020204" pitchFamily="34" charset="0"/>
@@ -14151,7 +14151,7 @@
                 <a:latin typeface="Arial" panose="020B0604020202020204" pitchFamily="34" charset="0"/>
                 <a:cs typeface="Arial" panose="020B0604020202020204" pitchFamily="34" charset="0"/>
               </a:rPr>
-              <a:t>08.02.2025</a:t>
+              <a:t>16.02.2025</a:t>
             </a:fld>
             <a:endParaRPr lang="de-DE">
               <a:latin typeface="Arial" panose="020B0604020202020204" pitchFamily="34" charset="0"/>
@@ -14959,7 +14959,7 @@
           <a:p>
             <a:fld id="{31F8C0B8-A119-4A07-B89F-6E701B20A39A}" type="datetime1">
               <a:rPr lang="de-DE" smtClean="0"/>
-              <a:t>08.02.2025</a:t>
+              <a:t>16.02.2025</a:t>
             </a:fld>
             <a:endParaRPr lang="de-DE"/>
           </a:p>
@@ -15385,7 +15385,7 @@
           <a:p>
             <a:fld id="{31F8C0B8-A119-4A07-B89F-6E701B20A39A}" type="datetime1">
               <a:rPr lang="de-DE" smtClean="0"/>
-              <a:t>08.02.2025</a:t>
+              <a:t>16.02.2025</a:t>
             </a:fld>
             <a:endParaRPr lang="de-DE"/>
           </a:p>
@@ -15617,7 +15617,7 @@
           <a:p>
             <a:fld id="{31F8C0B8-A119-4A07-B89F-6E701B20A39A}" type="datetime1">
               <a:rPr lang="de-DE" smtClean="0"/>
-              <a:t>08.02.2025</a:t>
+              <a:t>16.02.2025</a:t>
             </a:fld>
             <a:endParaRPr lang="de-DE"/>
           </a:p>
@@ -15792,7 +15792,7 @@
           <a:p>
             <a:fld id="{31F8C0B8-A119-4A07-B89F-6E701B20A39A}" type="datetime1">
               <a:rPr lang="de-DE" smtClean="0"/>
-              <a:t>08.02.2025</a:t>
+              <a:t>16.02.2025</a:t>
             </a:fld>
             <a:endParaRPr lang="de-DE"/>
           </a:p>
@@ -16102,7 +16102,7 @@
           <a:p>
             <a:fld id="{31F8C0B8-A119-4A07-B89F-6E701B20A39A}" type="datetime1">
               <a:rPr lang="de-DE" smtClean="0"/>
-              <a:t>08.02.2025</a:t>
+              <a:t>16.02.2025</a:t>
             </a:fld>
             <a:endParaRPr lang="de-DE"/>
           </a:p>
@@ -16439,7 +16439,7 @@
           <a:p>
             <a:fld id="{31F8C0B8-A119-4A07-B89F-6E701B20A39A}" type="datetime1">
               <a:rPr lang="de-DE" smtClean="0"/>
-              <a:t>08.02.2025</a:t>
+              <a:t>16.02.2025</a:t>
             </a:fld>
             <a:endParaRPr lang="de-DE"/>
           </a:p>
@@ -16589,7 +16589,7 @@
           <a:p>
             <a:fld id="{31F8C0B8-A119-4A07-B89F-6E701B20A39A}" type="datetime1">
               <a:rPr lang="de-DE" smtClean="0"/>
-              <a:t>08.02.2025</a:t>
+              <a:t>16.02.2025</a:t>
             </a:fld>
             <a:endParaRPr lang="de-DE"/>
           </a:p>
@@ -16610,7 +16610,7 @@
           <p:nvPr>
             <p:extLst>
               <p:ext uri="{D42A27DB-BD31-4B8C-83A1-F6EECF244321}">
-                <p14:modId xmlns:p14="http://schemas.microsoft.com/office/powerpoint/2010/main" val="3817659412"/>
+                <p14:modId xmlns:p14="http://schemas.microsoft.com/office/powerpoint/2010/main" val="634127864"/>
               </p:ext>
             </p:extLst>
           </p:nvPr>

</xml_diff>